<commit_message>
Update developer guide images#3
</commit_message>
<xml_diff>
--- a/docs/diagrams/HighLevelSequenceDiagrams.pptx
+++ b/docs/diagrams/HighLevelSequenceDiagrams.pptx
@@ -192,7 +192,7 @@
           <a:p>
             <a:fld id="{F5CC4B3F-88C1-4FFA-B1B6-F41C21DC6924}" type="datetimeFigureOut">
               <a:rPr lang="en-US" smtClean="0"/>
-              <a:t>10/16/2016</a:t>
+              <a:t>3/17/2018</a:t>
             </a:fld>
             <a:endParaRPr lang="en-US"/>
           </a:p>
@@ -641,7 +641,7 @@
           <a:p>
             <a:fld id="{78C97017-6FC3-485B-9764-EAC9E56C1D49}" type="datetimeFigureOut">
               <a:rPr lang="en-US" smtClean="0"/>
-              <a:t>10/16/2016</a:t>
+              <a:t>3/17/2018</a:t>
             </a:fld>
             <a:endParaRPr lang="en-US"/>
           </a:p>
@@ -811,7 +811,7 @@
           <a:p>
             <a:fld id="{78C97017-6FC3-485B-9764-EAC9E56C1D49}" type="datetimeFigureOut">
               <a:rPr lang="en-US" smtClean="0"/>
-              <a:t>10/16/2016</a:t>
+              <a:t>3/17/2018</a:t>
             </a:fld>
             <a:endParaRPr lang="en-US"/>
           </a:p>
@@ -991,7 +991,7 @@
           <a:p>
             <a:fld id="{78C97017-6FC3-485B-9764-EAC9E56C1D49}" type="datetimeFigureOut">
               <a:rPr lang="en-US" smtClean="0"/>
-              <a:t>10/16/2016</a:t>
+              <a:t>3/17/2018</a:t>
             </a:fld>
             <a:endParaRPr lang="en-US"/>
           </a:p>
@@ -1161,7 +1161,7 @@
           <a:p>
             <a:fld id="{78C97017-6FC3-485B-9764-EAC9E56C1D49}" type="datetimeFigureOut">
               <a:rPr lang="en-US" smtClean="0"/>
-              <a:t>10/16/2016</a:t>
+              <a:t>3/17/2018</a:t>
             </a:fld>
             <a:endParaRPr lang="en-US"/>
           </a:p>
@@ -1407,7 +1407,7 @@
           <a:p>
             <a:fld id="{78C97017-6FC3-485B-9764-EAC9E56C1D49}" type="datetimeFigureOut">
               <a:rPr lang="en-US" smtClean="0"/>
-              <a:t>10/16/2016</a:t>
+              <a:t>3/17/2018</a:t>
             </a:fld>
             <a:endParaRPr lang="en-US"/>
           </a:p>
@@ -1695,7 +1695,7 @@
           <a:p>
             <a:fld id="{78C97017-6FC3-485B-9764-EAC9E56C1D49}" type="datetimeFigureOut">
               <a:rPr lang="en-US" smtClean="0"/>
-              <a:t>10/16/2016</a:t>
+              <a:t>3/17/2018</a:t>
             </a:fld>
             <a:endParaRPr lang="en-US"/>
           </a:p>
@@ -2117,7 +2117,7 @@
           <a:p>
             <a:fld id="{78C97017-6FC3-485B-9764-EAC9E56C1D49}" type="datetimeFigureOut">
               <a:rPr lang="en-US" smtClean="0"/>
-              <a:t>10/16/2016</a:t>
+              <a:t>3/17/2018</a:t>
             </a:fld>
             <a:endParaRPr lang="en-US"/>
           </a:p>
@@ -2235,7 +2235,7 @@
           <a:p>
             <a:fld id="{78C97017-6FC3-485B-9764-EAC9E56C1D49}" type="datetimeFigureOut">
               <a:rPr lang="en-US" smtClean="0"/>
-              <a:t>10/16/2016</a:t>
+              <a:t>3/17/2018</a:t>
             </a:fld>
             <a:endParaRPr lang="en-US"/>
           </a:p>
@@ -2330,7 +2330,7 @@
           <a:p>
             <a:fld id="{78C97017-6FC3-485B-9764-EAC9E56C1D49}" type="datetimeFigureOut">
               <a:rPr lang="en-US" smtClean="0"/>
-              <a:t>10/16/2016</a:t>
+              <a:t>3/17/2018</a:t>
             </a:fld>
             <a:endParaRPr lang="en-US"/>
           </a:p>
@@ -2607,7 +2607,7 @@
           <a:p>
             <a:fld id="{78C97017-6FC3-485B-9764-EAC9E56C1D49}" type="datetimeFigureOut">
               <a:rPr lang="en-US" smtClean="0"/>
-              <a:t>10/16/2016</a:t>
+              <a:t>3/17/2018</a:t>
             </a:fld>
             <a:endParaRPr lang="en-US"/>
           </a:p>
@@ -2860,7 +2860,7 @@
           <a:p>
             <a:fld id="{78C97017-6FC3-485B-9764-EAC9E56C1D49}" type="datetimeFigureOut">
               <a:rPr lang="en-US" smtClean="0"/>
-              <a:t>10/16/2016</a:t>
+              <a:t>3/17/2018</a:t>
             </a:fld>
             <a:endParaRPr lang="en-US"/>
           </a:p>
@@ -3073,7 +3073,7 @@
           <a:p>
             <a:fld id="{78C97017-6FC3-485B-9764-EAC9E56C1D49}" type="datetimeFigureOut">
               <a:rPr lang="en-US" smtClean="0"/>
-              <a:t>10/16/2016</a:t>
+              <a:t>3/17/2018</a:t>
             </a:fld>
             <a:endParaRPr lang="en-US"/>
           </a:p>
@@ -4305,12 +4305,12 @@
           <a:lstStyle/>
           <a:p>
             <a:r>
-              <a:rPr lang="en-US" sz="1400" dirty="0" err="1" smtClean="0">
+              <a:rPr lang="en-US" sz="1400" smtClean="0">
                 <a:solidFill>
                   <a:srgbClr val="7030A0"/>
                 </a:solidFill>
               </a:rPr>
-              <a:t>deletePerson</a:t>
+              <a:t>deleteMember(p</a:t>
             </a:r>
             <a:r>
               <a:rPr lang="en-US" sz="1400" dirty="0" smtClean="0">
@@ -4318,7 +4318,7 @@
                   <a:srgbClr val="7030A0"/>
                 </a:solidFill>
               </a:rPr>
-              <a:t>(p)</a:t>
+              <a:t>)</a:t>
             </a:r>
             <a:endParaRPr lang="en-US" sz="1400" dirty="0">
               <a:solidFill>
@@ -4368,7 +4368,7 @@
                   </a:schemeClr>
                 </a:solidFill>
               </a:rPr>
-              <a:t>AddressBookChangedEvent</a:t>
+              <a:t>ClubBookChangedEvent</a:t>
             </a:r>
             <a:r>
               <a:rPr lang="en-US" sz="1400" dirty="0" smtClean="0">
@@ -4942,7 +4942,7 @@
                   </a:schemeClr>
                 </a:solidFill>
               </a:rPr>
-              <a:t>AddressBookChangedEvent</a:t>
+              <a:t>ClubBookChangedEvent</a:t>
             </a:r>
             <a:r>
               <a:rPr lang="en-US" sz="1400" dirty="0" smtClean="0">
@@ -5314,7 +5314,7 @@
                   </a:schemeClr>
                 </a:solidFill>
               </a:rPr>
-              <a:t>handleAddresssBookChangedEvent</a:t>
+              <a:t>handleClubBookChangedEvent</a:t>
             </a:r>
             <a:r>
               <a:rPr lang="en-US" sz="1400" dirty="0" smtClean="0">
@@ -5625,7 +5625,7 @@
                   <a:srgbClr val="00B050"/>
                 </a:solidFill>
               </a:rPr>
-              <a:t>handleAddresssBookChangedEvent</a:t>
+              <a:t>handleClubBookChangedEvent</a:t>
             </a:r>
             <a:r>
               <a:rPr lang="en-US" sz="1400" dirty="0" smtClean="0">

</xml_diff>

<commit_message>
Update developer guide images#5
</commit_message>
<xml_diff>
--- a/docs/diagrams/HighLevelSequenceDiagrams.pptx
+++ b/docs/diagrams/HighLevelSequenceDiagrams.pptx
@@ -4745,6 +4745,43 @@
           </a:fontRef>
         </p:style>
       </p:cxnSp>
+      <p:cxnSp>
+        <p:nvCxnSpPr>
+          <p:cNvPr id="85" name="Straight Connector 84"/>
+          <p:cNvCxnSpPr/>
+          <p:nvPr/>
+        </p:nvCxnSpPr>
+        <p:spPr>
+          <a:xfrm flipH="1">
+            <a:off x="314394" y="1099672"/>
+            <a:ext cx="24" cy="1598671"/>
+          </a:xfrm>
+          <a:prstGeom prst="line">
+            <a:avLst/>
+          </a:prstGeom>
+          <a:ln w="19050">
+            <a:solidFill>
+              <a:schemeClr val="tx1"/>
+            </a:solidFill>
+            <a:prstDash val="sysDash"/>
+          </a:ln>
+          <a:effectLst/>
+        </p:spPr>
+        <p:style>
+          <a:lnRef idx="1">
+            <a:schemeClr val="accent1"/>
+          </a:lnRef>
+          <a:fillRef idx="2">
+            <a:schemeClr val="accent1"/>
+          </a:fillRef>
+          <a:effectRef idx="1">
+            <a:schemeClr val="accent1"/>
+          </a:effectRef>
+          <a:fontRef idx="minor">
+            <a:schemeClr val="dk1"/>
+          </a:fontRef>
+        </p:style>
+      </p:cxnSp>
       <p:sp>
         <p:nvSpPr>
           <p:cNvPr id="53" name="Rectangle 62"/>
@@ -5336,43 +5373,6 @@
           </a:p>
         </p:txBody>
       </p:sp>
-      <p:cxnSp>
-        <p:nvCxnSpPr>
-          <p:cNvPr id="85" name="Straight Connector 84"/>
-          <p:cNvCxnSpPr/>
-          <p:nvPr/>
-        </p:nvCxnSpPr>
-        <p:spPr>
-          <a:xfrm flipH="1">
-            <a:off x="314394" y="1099672"/>
-            <a:ext cx="24" cy="1598671"/>
-          </a:xfrm>
-          <a:prstGeom prst="line">
-            <a:avLst/>
-          </a:prstGeom>
-          <a:ln w="19050">
-            <a:solidFill>
-              <a:schemeClr val="tx1"/>
-            </a:solidFill>
-            <a:prstDash val="sysDash"/>
-          </a:ln>
-          <a:effectLst/>
-        </p:spPr>
-        <p:style>
-          <a:lnRef idx="1">
-            <a:schemeClr val="accent1"/>
-          </a:lnRef>
-          <a:fillRef idx="2">
-            <a:schemeClr val="accent1"/>
-          </a:fillRef>
-          <a:effectRef idx="1">
-            <a:schemeClr val="accent1"/>
-          </a:effectRef>
-          <a:fontRef idx="minor">
-            <a:schemeClr val="dk1"/>
-          </a:fontRef>
-        </p:style>
-      </p:cxnSp>
       <p:sp>
         <p:nvSpPr>
           <p:cNvPr id="45" name="Rectangle 62"/>

</xml_diff>

<commit_message>
EmailCommand docs for DeveloperGuide
</commit_message>
<xml_diff>
--- a/docs/diagrams/HighLevelSequenceDiagrams.pptx
+++ b/docs/diagrams/HighLevelSequenceDiagrams.pptx
@@ -107,6 +107,22 @@
       </a:defRPr>
     </a:lvl9pPr>
   </p:defaultTextStyle>
+  <p:extLst>
+    <p:ext uri="{EFAFB233-063F-42B5-8137-9DF3F51BA10A}">
+      <p15:sldGuideLst xmlns:p15="http://schemas.microsoft.com/office/powerpoint/2012/main">
+        <p15:guide id="1" orient="horz" pos="1488">
+          <p15:clr>
+            <a:srgbClr val="A4A3A4"/>
+          </p15:clr>
+        </p15:guide>
+        <p15:guide id="2" pos="2880">
+          <p15:clr>
+            <a:srgbClr val="A4A3A4"/>
+          </p15:clr>
+        </p15:guide>
+      </p15:sldGuideLst>
+    </p:ext>
+  </p:extLst>
 </p:presentation>
 </file>
 
@@ -192,7 +208,7 @@
           <a:p>
             <a:fld id="{F5CC4B3F-88C1-4FFA-B1B6-F41C21DC6924}" type="datetimeFigureOut">
               <a:rPr lang="en-US" smtClean="0"/>
-              <a:t>3/17/2018</a:t>
+              <a:t>3/20/2018</a:t>
             </a:fld>
             <a:endParaRPr lang="en-US"/>
           </a:p>
@@ -256,38 +272,37 @@
           <a:p>
             <a:pPr lvl="0"/>
             <a:r>
-              <a:rPr lang="en-US" smtClean="0"/>
+              <a:rPr lang="en-US"/>
               <a:t>Click to edit Master text styles</a:t>
             </a:r>
           </a:p>
           <a:p>
             <a:pPr lvl="1"/>
             <a:r>
-              <a:rPr lang="en-US" smtClean="0"/>
+              <a:rPr lang="en-US"/>
               <a:t>Second level</a:t>
             </a:r>
           </a:p>
           <a:p>
             <a:pPr lvl="2"/>
             <a:r>
-              <a:rPr lang="en-US" smtClean="0"/>
+              <a:rPr lang="en-US"/>
               <a:t>Third level</a:t>
             </a:r>
           </a:p>
           <a:p>
             <a:pPr lvl="3"/>
             <a:r>
-              <a:rPr lang="en-US" smtClean="0"/>
+              <a:rPr lang="en-US"/>
               <a:t>Fourth level</a:t>
             </a:r>
           </a:p>
           <a:p>
             <a:pPr lvl="4"/>
             <a:r>
-              <a:rPr lang="en-US" smtClean="0"/>
+              <a:rPr lang="en-US"/>
               <a:t>Fifth level</a:t>
             </a:r>
-            <a:endParaRPr lang="en-US"/>
           </a:p>
         </p:txBody>
       </p:sp>
@@ -498,10 +513,9 @@
           <a:lstStyle/>
           <a:p>
             <a:r>
-              <a:rPr lang="en-US" smtClean="0"/>
+              <a:rPr lang="en-US"/>
               <a:t>Click to edit Master title style</a:t>
             </a:r>
-            <a:endParaRPr lang="en-US"/>
           </a:p>
         </p:txBody>
       </p:sp>
@@ -617,10 +631,9 @@
           </a:lstStyle>
           <a:p>
             <a:r>
-              <a:rPr lang="en-US" smtClean="0"/>
+              <a:rPr lang="en-US"/>
               <a:t>Click to edit Master subtitle style</a:t>
             </a:r>
-            <a:endParaRPr lang="en-US"/>
           </a:p>
         </p:txBody>
       </p:sp>
@@ -641,7 +654,7 @@
           <a:p>
             <a:fld id="{78C97017-6FC3-485B-9764-EAC9E56C1D49}" type="datetimeFigureOut">
               <a:rPr lang="en-US" smtClean="0"/>
-              <a:t>3/17/2018</a:t>
+              <a:t>3/20/2018</a:t>
             </a:fld>
             <a:endParaRPr lang="en-US"/>
           </a:p>
@@ -735,10 +748,9 @@
           <a:lstStyle/>
           <a:p>
             <a:r>
-              <a:rPr lang="en-US" smtClean="0"/>
+              <a:rPr lang="en-US"/>
               <a:t>Click to edit Master title style</a:t>
             </a:r>
-            <a:endParaRPr lang="en-US"/>
           </a:p>
         </p:txBody>
       </p:sp>
@@ -759,38 +771,37 @@
           <a:p>
             <a:pPr lvl="0"/>
             <a:r>
-              <a:rPr lang="en-US" smtClean="0"/>
+              <a:rPr lang="en-US"/>
               <a:t>Click to edit Master text styles</a:t>
             </a:r>
           </a:p>
           <a:p>
             <a:pPr lvl="1"/>
             <a:r>
-              <a:rPr lang="en-US" smtClean="0"/>
+              <a:rPr lang="en-US"/>
               <a:t>Second level</a:t>
             </a:r>
           </a:p>
           <a:p>
             <a:pPr lvl="2"/>
             <a:r>
-              <a:rPr lang="en-US" smtClean="0"/>
+              <a:rPr lang="en-US"/>
               <a:t>Third level</a:t>
             </a:r>
           </a:p>
           <a:p>
             <a:pPr lvl="3"/>
             <a:r>
-              <a:rPr lang="en-US" smtClean="0"/>
+              <a:rPr lang="en-US"/>
               <a:t>Fourth level</a:t>
             </a:r>
           </a:p>
           <a:p>
             <a:pPr lvl="4"/>
             <a:r>
-              <a:rPr lang="en-US" smtClean="0"/>
+              <a:rPr lang="en-US"/>
               <a:t>Fifth level</a:t>
             </a:r>
-            <a:endParaRPr lang="en-US"/>
           </a:p>
         </p:txBody>
       </p:sp>
@@ -811,7 +822,7 @@
           <a:p>
             <a:fld id="{78C97017-6FC3-485B-9764-EAC9E56C1D49}" type="datetimeFigureOut">
               <a:rPr lang="en-US" smtClean="0"/>
-              <a:t>3/17/2018</a:t>
+              <a:t>3/20/2018</a:t>
             </a:fld>
             <a:endParaRPr lang="en-US"/>
           </a:p>
@@ -910,10 +921,9 @@
           <a:lstStyle/>
           <a:p>
             <a:r>
-              <a:rPr lang="en-US" smtClean="0"/>
+              <a:rPr lang="en-US"/>
               <a:t>Click to edit Master title style</a:t>
             </a:r>
-            <a:endParaRPr lang="en-US"/>
           </a:p>
         </p:txBody>
       </p:sp>
@@ -939,38 +949,37 @@
           <a:p>
             <a:pPr lvl="0"/>
             <a:r>
-              <a:rPr lang="en-US" smtClean="0"/>
+              <a:rPr lang="en-US"/>
               <a:t>Click to edit Master text styles</a:t>
             </a:r>
           </a:p>
           <a:p>
             <a:pPr lvl="1"/>
             <a:r>
-              <a:rPr lang="en-US" smtClean="0"/>
+              <a:rPr lang="en-US"/>
               <a:t>Second level</a:t>
             </a:r>
           </a:p>
           <a:p>
             <a:pPr lvl="2"/>
             <a:r>
-              <a:rPr lang="en-US" smtClean="0"/>
+              <a:rPr lang="en-US"/>
               <a:t>Third level</a:t>
             </a:r>
           </a:p>
           <a:p>
             <a:pPr lvl="3"/>
             <a:r>
-              <a:rPr lang="en-US" smtClean="0"/>
+              <a:rPr lang="en-US"/>
               <a:t>Fourth level</a:t>
             </a:r>
           </a:p>
           <a:p>
             <a:pPr lvl="4"/>
             <a:r>
-              <a:rPr lang="en-US" smtClean="0"/>
+              <a:rPr lang="en-US"/>
               <a:t>Fifth level</a:t>
             </a:r>
-            <a:endParaRPr lang="en-US"/>
           </a:p>
         </p:txBody>
       </p:sp>
@@ -991,7 +1000,7 @@
           <a:p>
             <a:fld id="{78C97017-6FC3-485B-9764-EAC9E56C1D49}" type="datetimeFigureOut">
               <a:rPr lang="en-US" smtClean="0"/>
-              <a:t>3/17/2018</a:t>
+              <a:t>3/20/2018</a:t>
             </a:fld>
             <a:endParaRPr lang="en-US"/>
           </a:p>
@@ -1085,10 +1094,9 @@
           <a:lstStyle/>
           <a:p>
             <a:r>
-              <a:rPr lang="en-US" smtClean="0"/>
+              <a:rPr lang="en-US"/>
               <a:t>Click to edit Master title style</a:t>
             </a:r>
-            <a:endParaRPr lang="en-US"/>
           </a:p>
         </p:txBody>
       </p:sp>
@@ -1109,38 +1117,37 @@
           <a:p>
             <a:pPr lvl="0"/>
             <a:r>
-              <a:rPr lang="en-US" smtClean="0"/>
+              <a:rPr lang="en-US"/>
               <a:t>Click to edit Master text styles</a:t>
             </a:r>
           </a:p>
           <a:p>
             <a:pPr lvl="1"/>
             <a:r>
-              <a:rPr lang="en-US" smtClean="0"/>
+              <a:rPr lang="en-US"/>
               <a:t>Second level</a:t>
             </a:r>
           </a:p>
           <a:p>
             <a:pPr lvl="2"/>
             <a:r>
-              <a:rPr lang="en-US" smtClean="0"/>
+              <a:rPr lang="en-US"/>
               <a:t>Third level</a:t>
             </a:r>
           </a:p>
           <a:p>
             <a:pPr lvl="3"/>
             <a:r>
-              <a:rPr lang="en-US" smtClean="0"/>
+              <a:rPr lang="en-US"/>
               <a:t>Fourth level</a:t>
             </a:r>
           </a:p>
           <a:p>
             <a:pPr lvl="4"/>
             <a:r>
-              <a:rPr lang="en-US" smtClean="0"/>
+              <a:rPr lang="en-US"/>
               <a:t>Fifth level</a:t>
             </a:r>
-            <a:endParaRPr lang="en-US"/>
           </a:p>
         </p:txBody>
       </p:sp>
@@ -1161,7 +1168,7 @@
           <a:p>
             <a:fld id="{78C97017-6FC3-485B-9764-EAC9E56C1D49}" type="datetimeFigureOut">
               <a:rPr lang="en-US" smtClean="0"/>
-              <a:t>3/17/2018</a:t>
+              <a:t>3/20/2018</a:t>
             </a:fld>
             <a:endParaRPr lang="en-US"/>
           </a:p>
@@ -1264,10 +1271,9 @@
           </a:lstStyle>
           <a:p>
             <a:r>
-              <a:rPr lang="en-US" smtClean="0"/>
+              <a:rPr lang="en-US"/>
               <a:t>Click to edit Master title style</a:t>
             </a:r>
-            <a:endParaRPr lang="en-US"/>
           </a:p>
         </p:txBody>
       </p:sp>
@@ -1384,7 +1390,7 @@
           <a:p>
             <a:pPr lvl="0"/>
             <a:r>
-              <a:rPr lang="en-US" smtClean="0"/>
+              <a:rPr lang="en-US"/>
               <a:t>Click to edit Master text styles</a:t>
             </a:r>
           </a:p>
@@ -1407,7 +1413,7 @@
           <a:p>
             <a:fld id="{78C97017-6FC3-485B-9764-EAC9E56C1D49}" type="datetimeFigureOut">
               <a:rPr lang="en-US" smtClean="0"/>
-              <a:t>3/17/2018</a:t>
+              <a:t>3/20/2018</a:t>
             </a:fld>
             <a:endParaRPr lang="en-US"/>
           </a:p>
@@ -1501,10 +1507,9 @@
           <a:lstStyle/>
           <a:p>
             <a:r>
-              <a:rPr lang="en-US" smtClean="0"/>
+              <a:rPr lang="en-US"/>
               <a:t>Click to edit Master title style</a:t>
             </a:r>
-            <a:endParaRPr lang="en-US"/>
           </a:p>
         </p:txBody>
       </p:sp>
@@ -1558,38 +1563,37 @@
           <a:p>
             <a:pPr lvl="0"/>
             <a:r>
-              <a:rPr lang="en-US" smtClean="0"/>
+              <a:rPr lang="en-US"/>
               <a:t>Click to edit Master text styles</a:t>
             </a:r>
           </a:p>
           <a:p>
             <a:pPr lvl="1"/>
             <a:r>
-              <a:rPr lang="en-US" smtClean="0"/>
+              <a:rPr lang="en-US"/>
               <a:t>Second level</a:t>
             </a:r>
           </a:p>
           <a:p>
             <a:pPr lvl="2"/>
             <a:r>
-              <a:rPr lang="en-US" smtClean="0"/>
+              <a:rPr lang="en-US"/>
               <a:t>Third level</a:t>
             </a:r>
           </a:p>
           <a:p>
             <a:pPr lvl="3"/>
             <a:r>
-              <a:rPr lang="en-US" smtClean="0"/>
+              <a:rPr lang="en-US"/>
               <a:t>Fourth level</a:t>
             </a:r>
           </a:p>
           <a:p>
             <a:pPr lvl="4"/>
             <a:r>
-              <a:rPr lang="en-US" smtClean="0"/>
+              <a:rPr lang="en-US"/>
               <a:t>Fifth level</a:t>
             </a:r>
-            <a:endParaRPr lang="en-US"/>
           </a:p>
         </p:txBody>
       </p:sp>
@@ -1643,38 +1647,37 @@
           <a:p>
             <a:pPr lvl="0"/>
             <a:r>
-              <a:rPr lang="en-US" smtClean="0"/>
+              <a:rPr lang="en-US"/>
               <a:t>Click to edit Master text styles</a:t>
             </a:r>
           </a:p>
           <a:p>
             <a:pPr lvl="1"/>
             <a:r>
-              <a:rPr lang="en-US" smtClean="0"/>
+              <a:rPr lang="en-US"/>
               <a:t>Second level</a:t>
             </a:r>
           </a:p>
           <a:p>
             <a:pPr lvl="2"/>
             <a:r>
-              <a:rPr lang="en-US" smtClean="0"/>
+              <a:rPr lang="en-US"/>
               <a:t>Third level</a:t>
             </a:r>
           </a:p>
           <a:p>
             <a:pPr lvl="3"/>
             <a:r>
-              <a:rPr lang="en-US" smtClean="0"/>
+              <a:rPr lang="en-US"/>
               <a:t>Fourth level</a:t>
             </a:r>
           </a:p>
           <a:p>
             <a:pPr lvl="4"/>
             <a:r>
-              <a:rPr lang="en-US" smtClean="0"/>
+              <a:rPr lang="en-US"/>
               <a:t>Fifth level</a:t>
             </a:r>
-            <a:endParaRPr lang="en-US"/>
           </a:p>
         </p:txBody>
       </p:sp>
@@ -1695,7 +1698,7 @@
           <a:p>
             <a:fld id="{78C97017-6FC3-485B-9764-EAC9E56C1D49}" type="datetimeFigureOut">
               <a:rPr lang="en-US" smtClean="0"/>
-              <a:t>3/17/2018</a:t>
+              <a:t>3/20/2018</a:t>
             </a:fld>
             <a:endParaRPr lang="en-US"/>
           </a:p>
@@ -1793,10 +1796,9 @@
           </a:lstStyle>
           <a:p>
             <a:r>
-              <a:rPr lang="en-US" smtClean="0"/>
+              <a:rPr lang="en-US"/>
               <a:t>Click to edit Master title style</a:t>
             </a:r>
-            <a:endParaRPr lang="en-US"/>
           </a:p>
         </p:txBody>
       </p:sp>
@@ -1859,7 +1861,7 @@
           <a:p>
             <a:pPr lvl="0"/>
             <a:r>
-              <a:rPr lang="en-US" smtClean="0"/>
+              <a:rPr lang="en-US"/>
               <a:t>Click to edit Master text styles</a:t>
             </a:r>
           </a:p>
@@ -1915,38 +1917,37 @@
           <a:p>
             <a:pPr lvl="0"/>
             <a:r>
-              <a:rPr lang="en-US" smtClean="0"/>
+              <a:rPr lang="en-US"/>
               <a:t>Click to edit Master text styles</a:t>
             </a:r>
           </a:p>
           <a:p>
             <a:pPr lvl="1"/>
             <a:r>
-              <a:rPr lang="en-US" smtClean="0"/>
+              <a:rPr lang="en-US"/>
               <a:t>Second level</a:t>
             </a:r>
           </a:p>
           <a:p>
             <a:pPr lvl="2"/>
             <a:r>
-              <a:rPr lang="en-US" smtClean="0"/>
+              <a:rPr lang="en-US"/>
               <a:t>Third level</a:t>
             </a:r>
           </a:p>
           <a:p>
             <a:pPr lvl="3"/>
             <a:r>
-              <a:rPr lang="en-US" smtClean="0"/>
+              <a:rPr lang="en-US"/>
               <a:t>Fourth level</a:t>
             </a:r>
           </a:p>
           <a:p>
             <a:pPr lvl="4"/>
             <a:r>
-              <a:rPr lang="en-US" smtClean="0"/>
+              <a:rPr lang="en-US"/>
               <a:t>Fifth level</a:t>
             </a:r>
-            <a:endParaRPr lang="en-US"/>
           </a:p>
         </p:txBody>
       </p:sp>
@@ -2009,7 +2010,7 @@
           <a:p>
             <a:pPr lvl="0"/>
             <a:r>
-              <a:rPr lang="en-US" smtClean="0"/>
+              <a:rPr lang="en-US"/>
               <a:t>Click to edit Master text styles</a:t>
             </a:r>
           </a:p>
@@ -2065,38 +2066,37 @@
           <a:p>
             <a:pPr lvl="0"/>
             <a:r>
-              <a:rPr lang="en-US" smtClean="0"/>
+              <a:rPr lang="en-US"/>
               <a:t>Click to edit Master text styles</a:t>
             </a:r>
           </a:p>
           <a:p>
             <a:pPr lvl="1"/>
             <a:r>
-              <a:rPr lang="en-US" smtClean="0"/>
+              <a:rPr lang="en-US"/>
               <a:t>Second level</a:t>
             </a:r>
           </a:p>
           <a:p>
             <a:pPr lvl="2"/>
             <a:r>
-              <a:rPr lang="en-US" smtClean="0"/>
+              <a:rPr lang="en-US"/>
               <a:t>Third level</a:t>
             </a:r>
           </a:p>
           <a:p>
             <a:pPr lvl="3"/>
             <a:r>
-              <a:rPr lang="en-US" smtClean="0"/>
+              <a:rPr lang="en-US"/>
               <a:t>Fourth level</a:t>
             </a:r>
           </a:p>
           <a:p>
             <a:pPr lvl="4"/>
             <a:r>
-              <a:rPr lang="en-US" smtClean="0"/>
+              <a:rPr lang="en-US"/>
               <a:t>Fifth level</a:t>
             </a:r>
-            <a:endParaRPr lang="en-US"/>
           </a:p>
         </p:txBody>
       </p:sp>
@@ -2117,7 +2117,7 @@
           <a:p>
             <a:fld id="{78C97017-6FC3-485B-9764-EAC9E56C1D49}" type="datetimeFigureOut">
               <a:rPr lang="en-US" smtClean="0"/>
-              <a:t>3/17/2018</a:t>
+              <a:t>3/20/2018</a:t>
             </a:fld>
             <a:endParaRPr lang="en-US"/>
           </a:p>
@@ -2211,10 +2211,9 @@
           <a:lstStyle/>
           <a:p>
             <a:r>
-              <a:rPr lang="en-US" smtClean="0"/>
+              <a:rPr lang="en-US"/>
               <a:t>Click to edit Master title style</a:t>
             </a:r>
-            <a:endParaRPr lang="en-US"/>
           </a:p>
         </p:txBody>
       </p:sp>
@@ -2235,7 +2234,7 @@
           <a:p>
             <a:fld id="{78C97017-6FC3-485B-9764-EAC9E56C1D49}" type="datetimeFigureOut">
               <a:rPr lang="en-US" smtClean="0"/>
-              <a:t>3/17/2018</a:t>
+              <a:t>3/20/2018</a:t>
             </a:fld>
             <a:endParaRPr lang="en-US"/>
           </a:p>
@@ -2330,7 +2329,7 @@
           <a:p>
             <a:fld id="{78C97017-6FC3-485B-9764-EAC9E56C1D49}" type="datetimeFigureOut">
               <a:rPr lang="en-US" smtClean="0"/>
-              <a:t>3/17/2018</a:t>
+              <a:t>3/20/2018</a:t>
             </a:fld>
             <a:endParaRPr lang="en-US"/>
           </a:p>
@@ -2433,10 +2432,9 @@
           </a:lstStyle>
           <a:p>
             <a:r>
-              <a:rPr lang="en-US" smtClean="0"/>
+              <a:rPr lang="en-US"/>
               <a:t>Click to edit Master title style</a:t>
             </a:r>
-            <a:endParaRPr lang="en-US"/>
           </a:p>
         </p:txBody>
       </p:sp>
@@ -2490,38 +2488,37 @@
           <a:p>
             <a:pPr lvl="0"/>
             <a:r>
-              <a:rPr lang="en-US" smtClean="0"/>
+              <a:rPr lang="en-US"/>
               <a:t>Click to edit Master text styles</a:t>
             </a:r>
           </a:p>
           <a:p>
             <a:pPr lvl="1"/>
             <a:r>
-              <a:rPr lang="en-US" smtClean="0"/>
+              <a:rPr lang="en-US"/>
               <a:t>Second level</a:t>
             </a:r>
           </a:p>
           <a:p>
             <a:pPr lvl="2"/>
             <a:r>
-              <a:rPr lang="en-US" smtClean="0"/>
+              <a:rPr lang="en-US"/>
               <a:t>Third level</a:t>
             </a:r>
           </a:p>
           <a:p>
             <a:pPr lvl="3"/>
             <a:r>
-              <a:rPr lang="en-US" smtClean="0"/>
+              <a:rPr lang="en-US"/>
               <a:t>Fourth level</a:t>
             </a:r>
           </a:p>
           <a:p>
             <a:pPr lvl="4"/>
             <a:r>
-              <a:rPr lang="en-US" smtClean="0"/>
+              <a:rPr lang="en-US"/>
               <a:t>Fifth level</a:t>
             </a:r>
-            <a:endParaRPr lang="en-US"/>
           </a:p>
         </p:txBody>
       </p:sp>
@@ -2584,7 +2581,7 @@
           <a:p>
             <a:pPr lvl="0"/>
             <a:r>
-              <a:rPr lang="en-US" smtClean="0"/>
+              <a:rPr lang="en-US"/>
               <a:t>Click to edit Master text styles</a:t>
             </a:r>
           </a:p>
@@ -2607,7 +2604,7 @@
           <a:p>
             <a:fld id="{78C97017-6FC3-485B-9764-EAC9E56C1D49}" type="datetimeFigureOut">
               <a:rPr lang="en-US" smtClean="0"/>
-              <a:t>3/17/2018</a:t>
+              <a:t>3/20/2018</a:t>
             </a:fld>
             <a:endParaRPr lang="en-US"/>
           </a:p>
@@ -2710,10 +2707,9 @@
           </a:lstStyle>
           <a:p>
             <a:r>
-              <a:rPr lang="en-US" smtClean="0"/>
+              <a:rPr lang="en-US"/>
               <a:t>Click to edit Master title style</a:t>
             </a:r>
-            <a:endParaRPr lang="en-US"/>
           </a:p>
         </p:txBody>
       </p:sp>
@@ -2837,7 +2833,7 @@
           <a:p>
             <a:pPr lvl="0"/>
             <a:r>
-              <a:rPr lang="en-US" smtClean="0"/>
+              <a:rPr lang="en-US"/>
               <a:t>Click to edit Master text styles</a:t>
             </a:r>
           </a:p>
@@ -2860,7 +2856,7 @@
           <a:p>
             <a:fld id="{78C97017-6FC3-485B-9764-EAC9E56C1D49}" type="datetimeFigureOut">
               <a:rPr lang="en-US" smtClean="0"/>
-              <a:t>3/17/2018</a:t>
+              <a:t>3/20/2018</a:t>
             </a:fld>
             <a:endParaRPr lang="en-US"/>
           </a:p>
@@ -2969,10 +2965,9 @@
           <a:lstStyle/>
           <a:p>
             <a:r>
-              <a:rPr lang="en-US" smtClean="0"/>
+              <a:rPr lang="en-US"/>
               <a:t>Click to edit Master title style</a:t>
             </a:r>
-            <a:endParaRPr lang="en-US"/>
           </a:p>
         </p:txBody>
       </p:sp>
@@ -3003,38 +2998,37 @@
           <a:p>
             <a:pPr lvl="0"/>
             <a:r>
-              <a:rPr lang="en-US" smtClean="0"/>
+              <a:rPr lang="en-US"/>
               <a:t>Click to edit Master text styles</a:t>
             </a:r>
           </a:p>
           <a:p>
             <a:pPr lvl="1"/>
             <a:r>
-              <a:rPr lang="en-US" smtClean="0"/>
+              <a:rPr lang="en-US"/>
               <a:t>Second level</a:t>
             </a:r>
           </a:p>
           <a:p>
             <a:pPr lvl="2"/>
             <a:r>
-              <a:rPr lang="en-US" smtClean="0"/>
+              <a:rPr lang="en-US"/>
               <a:t>Third level</a:t>
             </a:r>
           </a:p>
           <a:p>
             <a:pPr lvl="3"/>
             <a:r>
-              <a:rPr lang="en-US" smtClean="0"/>
+              <a:rPr lang="en-US"/>
               <a:t>Fourth level</a:t>
             </a:r>
           </a:p>
           <a:p>
             <a:pPr lvl="4"/>
             <a:r>
-              <a:rPr lang="en-US" smtClean="0"/>
+              <a:rPr lang="en-US"/>
               <a:t>Fifth level</a:t>
             </a:r>
-            <a:endParaRPr lang="en-US"/>
           </a:p>
         </p:txBody>
       </p:sp>
@@ -3073,7 +3067,7 @@
           <a:p>
             <a:fld id="{78C97017-6FC3-485B-9764-EAC9E56C1D49}" type="datetimeFigureOut">
               <a:rPr lang="en-US" smtClean="0"/>
-              <a:t>3/17/2018</a:t>
+              <a:t>3/20/2018</a:t>
             </a:fld>
             <a:endParaRPr lang="en-US"/>
           </a:p>
@@ -3492,7 +3486,7 @@
           <a:p>
             <a:pPr algn="ctr"/>
             <a:r>
-              <a:rPr lang="en-US" sz="1600" dirty="0" smtClean="0">
+              <a:rPr lang="en-US" sz="1600" dirty="0">
                 <a:solidFill>
                   <a:schemeClr val="bg1"/>
                 </a:solidFill>
@@ -3856,7 +3850,7 @@
           <a:p>
             <a:pPr algn="ctr"/>
             <a:r>
-              <a:rPr lang="en-US" sz="1600" dirty="0" smtClean="0">
+              <a:rPr lang="en-US" sz="1600" dirty="0">
                 <a:solidFill>
                   <a:schemeClr val="bg1"/>
                 </a:solidFill>
@@ -4003,7 +3997,7 @@
           <a:p>
             <a:pPr algn="ctr"/>
             <a:r>
-              <a:rPr lang="en-US" sz="1600" dirty="0" smtClean="0">
+              <a:rPr lang="en-US" sz="1600" dirty="0">
                 <a:solidFill>
                   <a:schemeClr val="bg1"/>
                 </a:solidFill>
@@ -4165,10 +4159,9 @@
           <a:lstStyle/>
           <a:p>
             <a:r>
-              <a:rPr lang="en-US" sz="1400" dirty="0" smtClean="0"/>
+              <a:rPr lang="en-US" sz="1400" dirty="0"/>
               <a:t>delete 1</a:t>
             </a:r>
-            <a:endParaRPr lang="en-US" sz="1400" dirty="0"/>
           </a:p>
         </p:txBody>
       </p:sp>
@@ -4231,18 +4224,13 @@
           <a:lstStyle/>
           <a:p>
             <a:r>
-              <a:rPr lang="en-US" sz="1400" dirty="0" smtClean="0">
+              <a:rPr lang="en-US" sz="1400" dirty="0">
                 <a:solidFill>
                   <a:srgbClr val="0070C0"/>
                 </a:solidFill>
               </a:rPr>
               <a:t>execute(“delete 1”)</a:t>
             </a:r>
-            <a:endParaRPr lang="en-US" sz="1400" dirty="0">
-              <a:solidFill>
-                <a:srgbClr val="0070C0"/>
-              </a:solidFill>
-            </a:endParaRPr>
           </a:p>
         </p:txBody>
       </p:sp>
@@ -4305,26 +4293,21 @@
           <a:lstStyle/>
           <a:p>
             <a:r>
-              <a:rPr lang="en-US" sz="1400" smtClean="0">
+              <a:rPr lang="en-US" sz="1400" dirty="0" err="1">
                 <a:solidFill>
                   <a:srgbClr val="7030A0"/>
                 </a:solidFill>
               </a:rPr>
-              <a:t>deleteMember(p</a:t>
-            </a:r>
-            <a:r>
-              <a:rPr lang="en-US" sz="1400" dirty="0" smtClean="0">
+              <a:t>deleteMember</a:t>
+            </a:r>
+            <a:r>
+              <a:rPr lang="en-US" sz="1400" dirty="0">
                 <a:solidFill>
                   <a:srgbClr val="7030A0"/>
                 </a:solidFill>
               </a:rPr>
-              <a:t>)</a:t>
-            </a:r>
-            <a:endParaRPr lang="en-US" sz="1400" dirty="0">
-              <a:solidFill>
-                <a:srgbClr val="7030A0"/>
-              </a:solidFill>
-            </a:endParaRPr>
+              <a:t>(p)</a:t>
+            </a:r>
           </a:p>
         </p:txBody>
       </p:sp>
@@ -4351,7 +4334,7 @@
           <a:lstStyle/>
           <a:p>
             <a:r>
-              <a:rPr lang="en-US" sz="1400" dirty="0" smtClean="0">
+              <a:rPr lang="en-US" sz="1400" dirty="0">
                 <a:solidFill>
                   <a:schemeClr val="accent5">
                     <a:lumMod val="75000"/>
@@ -4361,7 +4344,7 @@
               <a:t>post(</a:t>
             </a:r>
             <a:r>
-              <a:rPr lang="en-US" sz="1400" dirty="0" err="1" smtClean="0">
+              <a:rPr lang="en-US" sz="1400" dirty="0" err="1">
                 <a:solidFill>
                   <a:schemeClr val="accent5">
                     <a:lumMod val="75000"/>
@@ -4371,7 +4354,7 @@
               <a:t>ClubBookChangedEvent</a:t>
             </a:r>
             <a:r>
-              <a:rPr lang="en-US" sz="1400" dirty="0" smtClean="0">
+              <a:rPr lang="en-US" sz="1400" dirty="0">
                 <a:solidFill>
                   <a:schemeClr val="accent5">
                     <a:lumMod val="75000"/>
@@ -4380,13 +4363,6 @@
               </a:rPr>
               <a:t>)</a:t>
             </a:r>
-            <a:endParaRPr lang="en-US" sz="1400" dirty="0">
-              <a:solidFill>
-                <a:schemeClr val="accent5">
-                  <a:lumMod val="75000"/>
-                </a:schemeClr>
-              </a:solidFill>
-            </a:endParaRPr>
           </a:p>
         </p:txBody>
       </p:sp>
@@ -4552,7 +4528,7 @@
           <a:p>
             <a:pPr algn="ctr"/>
             <a:r>
-              <a:rPr lang="en-US" sz="1600" dirty="0" smtClean="0">
+              <a:rPr lang="en-US" sz="1600" dirty="0">
                 <a:solidFill>
                   <a:schemeClr val="bg1"/>
                 </a:solidFill>
@@ -4560,7 +4536,7 @@
               <a:t>:</a:t>
             </a:r>
             <a:r>
-              <a:rPr lang="en-US" sz="1600" dirty="0" err="1" smtClean="0">
+              <a:rPr lang="en-US" sz="1600" dirty="0" err="1">
                 <a:solidFill>
                   <a:schemeClr val="bg1"/>
                 </a:solidFill>
@@ -4830,7 +4806,7 @@
           <a:p>
             <a:pPr algn="ctr"/>
             <a:r>
-              <a:rPr lang="en-US" sz="1600" dirty="0" smtClean="0">
+              <a:rPr lang="en-US" sz="1600" dirty="0">
                 <a:solidFill>
                   <a:schemeClr val="bg1"/>
                 </a:solidFill>
@@ -4962,7 +4938,7 @@
           <a:lstStyle/>
           <a:p>
             <a:r>
-              <a:rPr lang="en-US" sz="1400" dirty="0" smtClean="0">
+              <a:rPr lang="en-US" sz="1400" dirty="0">
                 <a:solidFill>
                   <a:schemeClr val="accent5">
                     <a:lumMod val="75000"/>
@@ -4972,7 +4948,7 @@
               <a:t>post(</a:t>
             </a:r>
             <a:r>
-              <a:rPr lang="en-US" sz="1400" dirty="0" err="1" smtClean="0">
+              <a:rPr lang="en-US" sz="1400" dirty="0" err="1">
                 <a:solidFill>
                   <a:schemeClr val="accent5">
                     <a:lumMod val="75000"/>
@@ -4982,7 +4958,7 @@
               <a:t>ClubBookChangedEvent</a:t>
             </a:r>
             <a:r>
-              <a:rPr lang="en-US" sz="1400" dirty="0" smtClean="0">
+              <a:rPr lang="en-US" sz="1400" dirty="0">
                 <a:solidFill>
                   <a:schemeClr val="accent5">
                     <a:lumMod val="75000"/>
@@ -4991,13 +4967,6 @@
               </a:rPr>
               <a:t>)</a:t>
             </a:r>
-            <a:endParaRPr lang="en-US" sz="1400" dirty="0">
-              <a:solidFill>
-                <a:schemeClr val="accent5">
-                  <a:lumMod val="75000"/>
-                </a:schemeClr>
-              </a:solidFill>
-            </a:endParaRPr>
           </a:p>
         </p:txBody>
       </p:sp>
@@ -5089,7 +5058,7 @@
           <a:p>
             <a:pPr algn="ctr"/>
             <a:r>
-              <a:rPr lang="en-US" sz="1600" dirty="0" smtClean="0">
+              <a:rPr lang="en-US" sz="1600" dirty="0">
                 <a:solidFill>
                   <a:schemeClr val="bg1"/>
                 </a:solidFill>
@@ -5097,7 +5066,7 @@
               <a:t>:</a:t>
             </a:r>
             <a:r>
-              <a:rPr lang="en-US" sz="1600" dirty="0" err="1" smtClean="0">
+              <a:rPr lang="en-US" sz="1600" dirty="0" err="1">
                 <a:solidFill>
                   <a:schemeClr val="bg1"/>
                 </a:solidFill>
@@ -5344,7 +5313,7 @@
           <a:lstStyle/>
           <a:p>
             <a:r>
-              <a:rPr lang="en-US" sz="1400" dirty="0" err="1" smtClean="0">
+              <a:rPr lang="en-US" sz="1400" dirty="0" err="1">
                 <a:solidFill>
                   <a:schemeClr val="accent6">
                     <a:lumMod val="75000"/>
@@ -5354,7 +5323,7 @@
               <a:t>handleClubBookChangedEvent</a:t>
             </a:r>
             <a:r>
-              <a:rPr lang="en-US" sz="1400" dirty="0" smtClean="0">
+              <a:rPr lang="en-US" sz="1400" dirty="0">
                 <a:solidFill>
                   <a:schemeClr val="accent6">
                     <a:lumMod val="75000"/>
@@ -5363,13 +5332,6 @@
               </a:rPr>
               <a:t>()</a:t>
             </a:r>
-            <a:endParaRPr lang="en-US" sz="1400" dirty="0">
-              <a:solidFill>
-                <a:schemeClr val="accent6">
-                  <a:lumMod val="75000"/>
-                </a:schemeClr>
-              </a:solidFill>
-            </a:endParaRPr>
           </a:p>
         </p:txBody>
       </p:sp>
@@ -5417,7 +5379,7 @@
           <a:p>
             <a:pPr algn="ctr"/>
             <a:r>
-              <a:rPr lang="en-US" sz="1600" dirty="0" smtClean="0">
+              <a:rPr lang="en-US" sz="1600" dirty="0">
                 <a:solidFill>
                   <a:schemeClr val="bg1"/>
                 </a:solidFill>
@@ -5620,7 +5582,7 @@
           <a:lstStyle/>
           <a:p>
             <a:r>
-              <a:rPr lang="en-US" sz="1400" dirty="0" err="1" smtClean="0">
+              <a:rPr lang="en-US" sz="1400" dirty="0" err="1">
                 <a:solidFill>
                   <a:srgbClr val="00B050"/>
                 </a:solidFill>
@@ -5628,18 +5590,13 @@
               <a:t>handleClubBookChangedEvent</a:t>
             </a:r>
             <a:r>
-              <a:rPr lang="en-US" sz="1400" dirty="0" smtClean="0">
+              <a:rPr lang="en-US" sz="1400" dirty="0">
                 <a:solidFill>
                   <a:srgbClr val="00B050"/>
                 </a:solidFill>
               </a:rPr>
               <a:t>()</a:t>
             </a:r>
-            <a:endParaRPr lang="en-US" sz="1400" dirty="0">
-              <a:solidFill>
-                <a:srgbClr val="00B050"/>
-              </a:solidFill>
-            </a:endParaRPr>
           </a:p>
         </p:txBody>
       </p:sp>
@@ -5826,18 +5783,13 @@
           <a:p>
             <a:pPr algn="r"/>
             <a:r>
-              <a:rPr lang="en-US" sz="1400" dirty="0" smtClean="0">
+              <a:rPr lang="en-US" sz="1400" dirty="0">
                 <a:solidFill>
                   <a:srgbClr val="00B050"/>
                 </a:solidFill>
               </a:rPr>
               <a:t>Update status bar</a:t>
             </a:r>
-            <a:endParaRPr lang="en-US" sz="1400" dirty="0">
-              <a:solidFill>
-                <a:srgbClr val="00B050"/>
-              </a:solidFill>
-            </a:endParaRPr>
           </a:p>
         </p:txBody>
       </p:sp>
@@ -6027,7 +5979,7 @@
           <a:lstStyle/>
           <a:p>
             <a:r>
-              <a:rPr lang="en-US" sz="1400" dirty="0" smtClean="0">
+              <a:rPr lang="en-US" sz="1400" dirty="0">
                 <a:solidFill>
                   <a:schemeClr val="accent6">
                     <a:lumMod val="75000"/>
@@ -6037,7 +5989,7 @@
               <a:t>Save </a:t>
             </a:r>
             <a:br>
-              <a:rPr lang="en-US" sz="1400" dirty="0" smtClean="0">
+              <a:rPr lang="en-US" sz="1400" dirty="0">
                 <a:solidFill>
                   <a:schemeClr val="accent6">
                     <a:lumMod val="75000"/>
@@ -6046,7 +5998,7 @@
               </a:rPr>
             </a:br>
             <a:r>
-              <a:rPr lang="en-US" sz="1400" dirty="0" smtClean="0">
+              <a:rPr lang="en-US" sz="1400" dirty="0">
                 <a:solidFill>
                   <a:schemeClr val="accent6">
                     <a:lumMod val="75000"/>
@@ -6055,13 +6007,6 @@
               </a:rPr>
               <a:t>to file</a:t>
             </a:r>
-            <a:endParaRPr lang="en-US" sz="1400" dirty="0">
-              <a:solidFill>
-                <a:schemeClr val="accent6">
-                  <a:lumMod val="75000"/>
-                </a:schemeClr>
-              </a:solidFill>
-            </a:endParaRPr>
           </a:p>
         </p:txBody>
       </p:sp>

</xml_diff>